<commit_message>
peer review section push
</commit_message>
<xml_diff>
--- a/Empirical Project.pptx
+++ b/Empirical Project.pptx
@@ -136,7 +136,7 @@
 <file path=ppt/revisionInfo.xml><?xml version="1.0" encoding="utf-8"?>
 <p1510:revInfo xmlns:a="http://schemas.openxmlformats.org/drawingml/2006/main" xmlns:r="http://schemas.openxmlformats.org/officeDocument/2006/relationships" xmlns:p1510="http://schemas.microsoft.com/office/powerpoint/2015/10/main">
   <p1510:revLst>
-    <p1510:client id="{29BE6DC3-2335-45B1-B9A5-6879D10D3146}" v="1366" dt="2025-04-23T00:09:30.436"/>
+    <p1510:client id="{29BE6DC3-2335-45B1-B9A5-6879D10D3146}" v="1402" dt="2025-05-02T09:55:38.694"/>
   </p1510:revLst>
 </p1510:revInfo>
 </file>
@@ -146,12 +146,12 @@
   <pc:docChgLst>
     <pc:chgData name="Magnus Rabben Bautz-Holter" userId="db22932b-4f39-4bed-aec1-22a662119d71" providerId="ADAL" clId="{29BE6DC3-2335-45B1-B9A5-6879D10D3146}"/>
     <pc:docChg chg="undo custSel addSld delSld modSld sldOrd modMainMaster">
-      <pc:chgData name="Magnus Rabben Bautz-Holter" userId="db22932b-4f39-4bed-aec1-22a662119d71" providerId="ADAL" clId="{29BE6DC3-2335-45B1-B9A5-6879D10D3146}" dt="2025-04-23T00:24:17.421" v="14193" actId="20577"/>
+      <pc:chgData name="Magnus Rabben Bautz-Holter" userId="db22932b-4f39-4bed-aec1-22a662119d71" providerId="ADAL" clId="{29BE6DC3-2335-45B1-B9A5-6879D10D3146}" dt="2025-05-02T09:55:38.694" v="14375" actId="20577"/>
       <pc:docMkLst>
         <pc:docMk/>
       </pc:docMkLst>
       <pc:sldChg chg="addSp delSp modSp mod">
-        <pc:chgData name="Magnus Rabben Bautz-Holter" userId="db22932b-4f39-4bed-aec1-22a662119d71" providerId="ADAL" clId="{29BE6DC3-2335-45B1-B9A5-6879D10D3146}" dt="2025-04-23T00:12:27.739" v="13657" actId="20577"/>
+        <pc:chgData name="Magnus Rabben Bautz-Holter" userId="db22932b-4f39-4bed-aec1-22a662119d71" providerId="ADAL" clId="{29BE6DC3-2335-45B1-B9A5-6879D10D3146}" dt="2025-05-02T08:47:31.041" v="14299" actId="20577"/>
         <pc:sldMkLst>
           <pc:docMk/>
           <pc:sldMk cId="42959303" sldId="257"/>
@@ -197,7 +197,7 @@
           </ac:spMkLst>
         </pc:spChg>
         <pc:spChg chg="add mod">
-          <ac:chgData name="Magnus Rabben Bautz-Holter" userId="db22932b-4f39-4bed-aec1-22a662119d71" providerId="ADAL" clId="{29BE6DC3-2335-45B1-B9A5-6879D10D3146}" dt="2025-04-23T00:10:35.958" v="13519" actId="20577"/>
+          <ac:chgData name="Magnus Rabben Bautz-Holter" userId="db22932b-4f39-4bed-aec1-22a662119d71" providerId="ADAL" clId="{29BE6DC3-2335-45B1-B9A5-6879D10D3146}" dt="2025-05-02T08:47:31.041" v="14299" actId="20577"/>
           <ac:spMkLst>
             <pc:docMk/>
             <pc:sldMk cId="42959303" sldId="257"/>
@@ -221,7 +221,7 @@
           </ac:spMkLst>
         </pc:spChg>
         <pc:spChg chg="mod">
-          <ac:chgData name="Magnus Rabben Bautz-Holter" userId="db22932b-4f39-4bed-aec1-22a662119d71" providerId="ADAL" clId="{29BE6DC3-2335-45B1-B9A5-6879D10D3146}" dt="2025-04-17T08:33:40.989" v="1" actId="14100"/>
+          <ac:chgData name="Magnus Rabben Bautz-Holter" userId="db22932b-4f39-4bed-aec1-22a662119d71" providerId="ADAL" clId="{29BE6DC3-2335-45B1-B9A5-6879D10D3146}" dt="2025-05-02T08:37:29.569" v="14203" actId="1038"/>
           <ac:spMkLst>
             <pc:docMk/>
             <pc:sldMk cId="42959303" sldId="257"/>
@@ -276,14 +276,6 @@
             <ac:spMk id="32" creationId="{22847FBF-C3EB-243E-9617-6E2CB7F62149}"/>
           </ac:spMkLst>
         </pc:spChg>
-        <pc:spChg chg="add del mod">
-          <ac:chgData name="Magnus Rabben Bautz-Holter" userId="db22932b-4f39-4bed-aec1-22a662119d71" providerId="ADAL" clId="{29BE6DC3-2335-45B1-B9A5-6879D10D3146}" dt="2025-04-22T23:47:30.303" v="11982" actId="478"/>
-          <ac:spMkLst>
-            <pc:docMk/>
-            <pc:sldMk cId="42959303" sldId="257"/>
-            <ac:spMk id="36" creationId="{C711F698-1F77-65F2-2DA8-A7FBE1111729}"/>
-          </ac:spMkLst>
-        </pc:spChg>
         <pc:graphicFrameChg chg="mod">
           <ac:chgData name="Magnus Rabben Bautz-Holter" userId="db22932b-4f39-4bed-aec1-22a662119d71" providerId="ADAL" clId="{29BE6DC3-2335-45B1-B9A5-6879D10D3146}" dt="2025-04-17T08:52:24.183" v="2518"/>
           <ac:graphicFrameMkLst>
@@ -294,13 +286,13 @@
         </pc:graphicFrameChg>
       </pc:sldChg>
       <pc:sldChg chg="addSp delSp modSp add mod">
-        <pc:chgData name="Magnus Rabben Bautz-Holter" userId="db22932b-4f39-4bed-aec1-22a662119d71" providerId="ADAL" clId="{29BE6DC3-2335-45B1-B9A5-6879D10D3146}" dt="2025-04-22T23:47:41.483" v="12037"/>
+        <pc:chgData name="Magnus Rabben Bautz-Holter" userId="db22932b-4f39-4bed-aec1-22a662119d71" providerId="ADAL" clId="{29BE6DC3-2335-45B1-B9A5-6879D10D3146}" dt="2025-05-02T08:44:58.198" v="14284"/>
         <pc:sldMkLst>
           <pc:docMk/>
           <pc:sldMk cId="2088811925" sldId="258"/>
         </pc:sldMkLst>
         <pc:spChg chg="mod">
-          <ac:chgData name="Magnus Rabben Bautz-Holter" userId="db22932b-4f39-4bed-aec1-22a662119d71" providerId="ADAL" clId="{29BE6DC3-2335-45B1-B9A5-6879D10D3146}" dt="2025-04-22T23:47:41.454" v="12013" actId="948"/>
+          <ac:chgData name="Magnus Rabben Bautz-Holter" userId="db22932b-4f39-4bed-aec1-22a662119d71" providerId="ADAL" clId="{29BE6DC3-2335-45B1-B9A5-6879D10D3146}" dt="2025-05-02T08:44:58.145" v="14260" actId="948"/>
           <ac:spMkLst>
             <pc:docMk/>
             <pc:sldMk cId="2088811925" sldId="258"/>
@@ -308,19 +300,27 @@
           </ac:spMkLst>
         </pc:spChg>
         <pc:spChg chg="add del mod modVis">
-          <ac:chgData name="Magnus Rabben Bautz-Holter" userId="db22932b-4f39-4bed-aec1-22a662119d71" providerId="ADAL" clId="{29BE6DC3-2335-45B1-B9A5-6879D10D3146}" dt="2025-04-22T23:47:40.693" v="12008"/>
+          <ac:chgData name="Magnus Rabben Bautz-Holter" userId="db22932b-4f39-4bed-aec1-22a662119d71" providerId="ADAL" clId="{29BE6DC3-2335-45B1-B9A5-6879D10D3146}" dt="2025-05-02T08:44:56.342" v="14228"/>
           <ac:spMkLst>
             <pc:docMk/>
             <pc:sldMk cId="2088811925" sldId="258"/>
-            <ac:spMk id="3" creationId="{CFBAEE59-B517-3C6C-EF24-5AFD017B3EA6}"/>
+            <ac:spMk id="3" creationId="{942BAE2F-A5AC-593B-8185-E976BAE76884}"/>
           </ac:spMkLst>
         </pc:spChg>
         <pc:spChg chg="add del mod modVis">
-          <ac:chgData name="Magnus Rabben Bautz-Holter" userId="db22932b-4f39-4bed-aec1-22a662119d71" providerId="ADAL" clId="{29BE6DC3-2335-45B1-B9A5-6879D10D3146}" dt="2025-04-22T23:47:41.483" v="12035"/>
+          <ac:chgData name="Magnus Rabben Bautz-Holter" userId="db22932b-4f39-4bed-aec1-22a662119d71" providerId="ADAL" clId="{29BE6DC3-2335-45B1-B9A5-6879D10D3146}" dt="2025-05-02T08:44:57.241" v="14256"/>
           <ac:spMkLst>
             <pc:docMk/>
             <pc:sldMk cId="2088811925" sldId="258"/>
-            <ac:spMk id="5" creationId="{BB1B76B1-7078-EA44-19C2-2E2161A891F2}"/>
+            <ac:spMk id="5" creationId="{35CEF127-DF63-E553-C960-749C5572FA06}"/>
+          </ac:spMkLst>
+        </pc:spChg>
+        <pc:spChg chg="add del mod modVis">
+          <ac:chgData name="Magnus Rabben Bautz-Holter" userId="db22932b-4f39-4bed-aec1-22a662119d71" providerId="ADAL" clId="{29BE6DC3-2335-45B1-B9A5-6879D10D3146}" dt="2025-05-02T08:44:58.196" v="14282"/>
+          <ac:spMkLst>
+            <pc:docMk/>
+            <pc:sldMk cId="2088811925" sldId="258"/>
+            <ac:spMk id="6" creationId="{4EB70AB2-FD74-924A-47E7-9C400B4B0E02}"/>
           </ac:spMkLst>
         </pc:spChg>
         <pc:spChg chg="add mod">
@@ -339,16 +339,8 @@
             <ac:spMk id="18" creationId="{5AE4C880-F999-EA39-A2E6-7D325EC3AA92}"/>
           </ac:spMkLst>
         </pc:spChg>
-        <pc:spChg chg="add del mod">
-          <ac:chgData name="Magnus Rabben Bautz-Holter" userId="db22932b-4f39-4bed-aec1-22a662119d71" providerId="ADAL" clId="{29BE6DC3-2335-45B1-B9A5-6879D10D3146}" dt="2025-04-22T23:43:28.896" v="11979" actId="478"/>
-          <ac:spMkLst>
-            <pc:docMk/>
-            <pc:sldMk cId="2088811925" sldId="258"/>
-            <ac:spMk id="19" creationId="{6DC828A8-341A-E88B-5062-3C144E134A91}"/>
-          </ac:spMkLst>
-        </pc:spChg>
         <pc:graphicFrameChg chg="mod">
-          <ac:chgData name="Magnus Rabben Bautz-Holter" userId="db22932b-4f39-4bed-aec1-22a662119d71" providerId="ADAL" clId="{29BE6DC3-2335-45B1-B9A5-6879D10D3146}" dt="2025-04-22T23:47:41.483" v="12037"/>
+          <ac:chgData name="Magnus Rabben Bautz-Holter" userId="db22932b-4f39-4bed-aec1-22a662119d71" providerId="ADAL" clId="{29BE6DC3-2335-45B1-B9A5-6879D10D3146}" dt="2025-05-02T08:44:58.198" v="14284"/>
           <ac:graphicFrameMkLst>
             <pc:docMk/>
             <pc:sldMk cId="2088811925" sldId="258"/>
@@ -377,46 +369,6 @@
             <ac:spMk id="2" creationId="{E542AA4B-534B-5F8C-CC65-1CDC4781E7E7}"/>
           </ac:spMkLst>
         </pc:spChg>
-        <pc:spChg chg="add del mod modVis">
-          <ac:chgData name="Magnus Rabben Bautz-Holter" userId="db22932b-4f39-4bed-aec1-22a662119d71" providerId="ADAL" clId="{29BE6DC3-2335-45B1-B9A5-6879D10D3146}" dt="2025-04-22T23:48:12.255" v="12062"/>
-          <ac:spMkLst>
-            <pc:docMk/>
-            <pc:sldMk cId="3070455392" sldId="259"/>
-            <ac:spMk id="3" creationId="{D4945FC3-433D-9580-227A-E7D93B9B1725}"/>
-          </ac:spMkLst>
-        </pc:spChg>
-        <pc:spChg chg="add del mod modVis">
-          <ac:chgData name="Magnus Rabben Bautz-Holter" userId="db22932b-4f39-4bed-aec1-22a662119d71" providerId="ADAL" clId="{29BE6DC3-2335-45B1-B9A5-6879D10D3146}" dt="2025-04-22T23:48:13.111" v="12089"/>
-          <ac:spMkLst>
-            <pc:docMk/>
-            <pc:sldMk cId="3070455392" sldId="259"/>
-            <ac:spMk id="5" creationId="{0CDBFB9A-7FC7-820E-946A-61FB1994460F}"/>
-          </ac:spMkLst>
-        </pc:spChg>
-        <pc:spChg chg="add del mod">
-          <ac:chgData name="Magnus Rabben Bautz-Holter" userId="db22932b-4f39-4bed-aec1-22a662119d71" providerId="ADAL" clId="{29BE6DC3-2335-45B1-B9A5-6879D10D3146}" dt="2025-04-22T23:43:21.458" v="11976" actId="478"/>
-          <ac:spMkLst>
-            <pc:docMk/>
-            <pc:sldMk cId="3070455392" sldId="259"/>
-            <ac:spMk id="6" creationId="{DA6A12B9-1B62-203C-9BCD-C4F3B73880B3}"/>
-          </ac:spMkLst>
-        </pc:spChg>
-        <pc:spChg chg="add del mod modVis">
-          <ac:chgData name="Magnus Rabben Bautz-Holter" userId="db22932b-4f39-4bed-aec1-22a662119d71" providerId="ADAL" clId="{29BE6DC3-2335-45B1-B9A5-6879D10D3146}" dt="2025-04-22T23:48:14.206" v="12115"/>
-          <ac:spMkLst>
-            <pc:docMk/>
-            <pc:sldMk cId="3070455392" sldId="259"/>
-            <ac:spMk id="7" creationId="{DAD994FD-59AE-CCFD-60D1-AA233911370D}"/>
-          </ac:spMkLst>
-        </pc:spChg>
-        <pc:spChg chg="add del mod modVis">
-          <ac:chgData name="Magnus Rabben Bautz-Holter" userId="db22932b-4f39-4bed-aec1-22a662119d71" providerId="ADAL" clId="{29BE6DC3-2335-45B1-B9A5-6879D10D3146}" dt="2025-04-22T23:48:14.906" v="12141"/>
-          <ac:spMkLst>
-            <pc:docMk/>
-            <pc:sldMk cId="3070455392" sldId="259"/>
-            <ac:spMk id="8" creationId="{2621409C-596F-4DF7-6FE4-595B0A45A195}"/>
-          </ac:spMkLst>
-        </pc:spChg>
         <pc:spChg chg="add mod">
           <ac:chgData name="Magnus Rabben Bautz-Holter" userId="db22932b-4f39-4bed-aec1-22a662119d71" providerId="ADAL" clId="{29BE6DC3-2335-45B1-B9A5-6879D10D3146}" dt="2025-04-17T10:42:23.123" v="5403" actId="12788"/>
           <ac:spMkLst>
@@ -431,30 +383,6 @@
             <pc:docMk/>
             <pc:sldMk cId="3070455392" sldId="259"/>
             <ac:spMk id="10" creationId="{9F3AAC61-096B-A81A-6284-C4DB887F46D7}"/>
-          </ac:spMkLst>
-        </pc:spChg>
-        <pc:spChg chg="add del mod modVis">
-          <ac:chgData name="Magnus Rabben Bautz-Holter" userId="db22932b-4f39-4bed-aec1-22a662119d71" providerId="ADAL" clId="{29BE6DC3-2335-45B1-B9A5-6879D10D3146}" dt="2025-04-22T23:48:15.625" v="12167"/>
-          <ac:spMkLst>
-            <pc:docMk/>
-            <pc:sldMk cId="3070455392" sldId="259"/>
-            <ac:spMk id="11" creationId="{A43E448C-2A6B-BE79-0570-6262F292C741}"/>
-          </ac:spMkLst>
-        </pc:spChg>
-        <pc:spChg chg="add del mod modVis">
-          <ac:chgData name="Magnus Rabben Bautz-Holter" userId="db22932b-4f39-4bed-aec1-22a662119d71" providerId="ADAL" clId="{29BE6DC3-2335-45B1-B9A5-6879D10D3146}" dt="2025-04-22T23:48:18.454" v="12193"/>
-          <ac:spMkLst>
-            <pc:docMk/>
-            <pc:sldMk cId="3070455392" sldId="259"/>
-            <ac:spMk id="12" creationId="{96233150-AAB5-C914-F988-DCA24280BE89}"/>
-          </ac:spMkLst>
-        </pc:spChg>
-        <pc:spChg chg="add del mod modVis">
-          <ac:chgData name="Magnus Rabben Bautz-Holter" userId="db22932b-4f39-4bed-aec1-22a662119d71" providerId="ADAL" clId="{29BE6DC3-2335-45B1-B9A5-6879D10D3146}" dt="2025-04-22T23:48:19.346" v="12220"/>
-          <ac:spMkLst>
-            <pc:docMk/>
-            <pc:sldMk cId="3070455392" sldId="259"/>
-            <ac:spMk id="13" creationId="{4FE2C68E-FEAA-2068-97A1-DDA9D9D5D2CD}"/>
           </ac:spMkLst>
         </pc:spChg>
         <pc:spChg chg="add mod">
@@ -518,94 +446,6 @@
             <pc:docMk/>
             <pc:sldMk cId="3196527024" sldId="260"/>
             <ac:spMk id="6" creationId="{B4687966-91E9-97A8-49C1-1D8EEDF830CE}"/>
-          </ac:spMkLst>
-        </pc:spChg>
-        <pc:spChg chg="add del mod modVis">
-          <ac:chgData name="Magnus Rabben Bautz-Holter" userId="db22932b-4f39-4bed-aec1-22a662119d71" providerId="ADAL" clId="{29BE6DC3-2335-45B1-B9A5-6879D10D3146}" dt="2025-04-22T23:04:57.397" v="9941"/>
-          <ac:spMkLst>
-            <pc:docMk/>
-            <pc:sldMk cId="3196527024" sldId="260"/>
-            <ac:spMk id="7" creationId="{26C7944E-AD1F-6A98-C8EF-D87F4E36C728}"/>
-          </ac:spMkLst>
-        </pc:spChg>
-        <pc:spChg chg="add del mod modVis">
-          <ac:chgData name="Magnus Rabben Bautz-Holter" userId="db22932b-4f39-4bed-aec1-22a662119d71" providerId="ADAL" clId="{29BE6DC3-2335-45B1-B9A5-6879D10D3146}" dt="2025-04-22T23:04:58.698" v="9968"/>
-          <ac:spMkLst>
-            <pc:docMk/>
-            <pc:sldMk cId="3196527024" sldId="260"/>
-            <ac:spMk id="8" creationId="{D429104A-0557-39CD-73FB-4AE0A62AF390}"/>
-          </ac:spMkLst>
-        </pc:spChg>
-        <pc:spChg chg="add del mod modVis">
-          <ac:chgData name="Magnus Rabben Bautz-Holter" userId="db22932b-4f39-4bed-aec1-22a662119d71" providerId="ADAL" clId="{29BE6DC3-2335-45B1-B9A5-6879D10D3146}" dt="2025-04-22T23:05:00.543" v="9999"/>
-          <ac:spMkLst>
-            <pc:docMk/>
-            <pc:sldMk cId="3196527024" sldId="260"/>
-            <ac:spMk id="9" creationId="{7B42AED2-A4B4-8709-0B4A-BDA87BA8C702}"/>
-          </ac:spMkLst>
-        </pc:spChg>
-        <pc:spChg chg="add del mod modVis">
-          <ac:chgData name="Magnus Rabben Bautz-Holter" userId="db22932b-4f39-4bed-aec1-22a662119d71" providerId="ADAL" clId="{29BE6DC3-2335-45B1-B9A5-6879D10D3146}" dt="2025-04-22T23:05:01.539" v="10025"/>
-          <ac:spMkLst>
-            <pc:docMk/>
-            <pc:sldMk cId="3196527024" sldId="260"/>
-            <ac:spMk id="10" creationId="{28786CBB-A120-4130-20E2-E652B36CCD80}"/>
-          </ac:spMkLst>
-        </pc:spChg>
-        <pc:spChg chg="add del mod modVis">
-          <ac:chgData name="Magnus Rabben Bautz-Holter" userId="db22932b-4f39-4bed-aec1-22a662119d71" providerId="ADAL" clId="{29BE6DC3-2335-45B1-B9A5-6879D10D3146}" dt="2025-04-22T23:05:05.498" v="10076"/>
-          <ac:spMkLst>
-            <pc:docMk/>
-            <pc:sldMk cId="3196527024" sldId="260"/>
-            <ac:spMk id="11" creationId="{61F2BE75-50EA-DDB1-AA5A-11BAAA495A33}"/>
-          </ac:spMkLst>
-        </pc:spChg>
-        <pc:spChg chg="add del mod modVis">
-          <ac:chgData name="Magnus Rabben Bautz-Holter" userId="db22932b-4f39-4bed-aec1-22a662119d71" providerId="ADAL" clId="{29BE6DC3-2335-45B1-B9A5-6879D10D3146}" dt="2025-04-22T23:05:08.887" v="10115"/>
-          <ac:spMkLst>
-            <pc:docMk/>
-            <pc:sldMk cId="3196527024" sldId="260"/>
-            <ac:spMk id="12" creationId="{09C7B459-BC06-609A-B614-8873CBF284B2}"/>
-          </ac:spMkLst>
-        </pc:spChg>
-        <pc:spChg chg="add del mod modVis">
-          <ac:chgData name="Magnus Rabben Bautz-Holter" userId="db22932b-4f39-4bed-aec1-22a662119d71" providerId="ADAL" clId="{29BE6DC3-2335-45B1-B9A5-6879D10D3146}" dt="2025-04-22T23:05:14.798" v="10173"/>
-          <ac:spMkLst>
-            <pc:docMk/>
-            <pc:sldMk cId="3196527024" sldId="260"/>
-            <ac:spMk id="13" creationId="{19601F35-1B19-9201-F9C1-3D4A6DF6CBBA}"/>
-          </ac:spMkLst>
-        </pc:spChg>
-        <pc:spChg chg="add del mod modVis">
-          <ac:chgData name="Magnus Rabben Bautz-Holter" userId="db22932b-4f39-4bed-aec1-22a662119d71" providerId="ADAL" clId="{29BE6DC3-2335-45B1-B9A5-6879D10D3146}" dt="2025-04-22T23:05:16.859" v="10208"/>
-          <ac:spMkLst>
-            <pc:docMk/>
-            <pc:sldMk cId="3196527024" sldId="260"/>
-            <ac:spMk id="14" creationId="{A6F38E1C-9749-6502-9CF3-0BB02246CC8D}"/>
-          </ac:spMkLst>
-        </pc:spChg>
-        <pc:spChg chg="add del mod modVis">
-          <ac:chgData name="Magnus Rabben Bautz-Holter" userId="db22932b-4f39-4bed-aec1-22a662119d71" providerId="ADAL" clId="{29BE6DC3-2335-45B1-B9A5-6879D10D3146}" dt="2025-04-22T23:05:18.127" v="10238"/>
-          <ac:spMkLst>
-            <pc:docMk/>
-            <pc:sldMk cId="3196527024" sldId="260"/>
-            <ac:spMk id="15" creationId="{3CCE8171-442A-C5E5-DE17-037EB6C45DB4}"/>
-          </ac:spMkLst>
-        </pc:spChg>
-        <pc:spChg chg="add del mod modVis">
-          <ac:chgData name="Magnus Rabben Bautz-Holter" userId="db22932b-4f39-4bed-aec1-22a662119d71" providerId="ADAL" clId="{29BE6DC3-2335-45B1-B9A5-6879D10D3146}" dt="2025-04-22T23:05:20.767" v="10270"/>
-          <ac:spMkLst>
-            <pc:docMk/>
-            <pc:sldMk cId="3196527024" sldId="260"/>
-            <ac:spMk id="16" creationId="{232BAD70-2F47-4A57-3867-E38667EB9542}"/>
-          </ac:spMkLst>
-        </pc:spChg>
-        <pc:spChg chg="add del mod modVis">
-          <ac:chgData name="Magnus Rabben Bautz-Holter" userId="db22932b-4f39-4bed-aec1-22a662119d71" providerId="ADAL" clId="{29BE6DC3-2335-45B1-B9A5-6879D10D3146}" dt="2025-04-22T23:05:23.779" v="10301"/>
-          <ac:spMkLst>
-            <pc:docMk/>
-            <pc:sldMk cId="3196527024" sldId="260"/>
-            <ac:spMk id="17" creationId="{E906C61E-7C11-AB4D-E6D1-5D17D5E3CE27}"/>
           </ac:spMkLst>
         </pc:spChg>
         <pc:spChg chg="add mod">
@@ -751,14 +591,6 @@
             <ac:spMk id="40" creationId="{0E1F3C4F-BEBF-976C-49E0-2D6B969E629A}"/>
           </ac:spMkLst>
         </pc:spChg>
-        <pc:spChg chg="add del mod">
-          <ac:chgData name="Magnus Rabben Bautz-Holter" userId="db22932b-4f39-4bed-aec1-22a662119d71" providerId="ADAL" clId="{29BE6DC3-2335-45B1-B9A5-6879D10D3146}" dt="2025-04-22T23:43:25.206" v="11978" actId="478"/>
-          <ac:spMkLst>
-            <pc:docMk/>
-            <pc:sldMk cId="1043233406" sldId="261"/>
-            <ac:spMk id="41" creationId="{BEAA527E-43BE-F480-3FFF-709ECA37A874}"/>
-          </ac:spMkLst>
-        </pc:spChg>
         <pc:graphicFrameChg chg="mod">
           <ac:chgData name="Magnus Rabben Bautz-Holter" userId="db22932b-4f39-4bed-aec1-22a662119d71" providerId="ADAL" clId="{29BE6DC3-2335-45B1-B9A5-6879D10D3146}" dt="2025-04-17T08:51:01.579" v="1858"/>
           <ac:graphicFrameMkLst>
@@ -793,7 +625,7 @@
         </pc:picChg>
       </pc:sldChg>
       <pc:sldChg chg="addSp delSp modSp add mod ord">
-        <pc:chgData name="Magnus Rabben Bautz-Holter" userId="db22932b-4f39-4bed-aec1-22a662119d71" providerId="ADAL" clId="{29BE6DC3-2335-45B1-B9A5-6879D10D3146}" dt="2025-04-22T23:43:19.909" v="11975" actId="478"/>
+        <pc:chgData name="Magnus Rabben Bautz-Holter" userId="db22932b-4f39-4bed-aec1-22a662119d71" providerId="ADAL" clId="{29BE6DC3-2335-45B1-B9A5-6879D10D3146}" dt="2025-05-02T09:55:38.694" v="14375" actId="20577"/>
         <pc:sldMkLst>
           <pc:docMk/>
           <pc:sldMk cId="3956818408" sldId="262"/>
@@ -804,14 +636,6 @@
             <pc:docMk/>
             <pc:sldMk cId="3956818408" sldId="262"/>
             <ac:spMk id="2" creationId="{4D57835B-C652-311C-E2F5-0EC1536FDC28}"/>
-          </ac:spMkLst>
-        </pc:spChg>
-        <pc:spChg chg="add del mod">
-          <ac:chgData name="Magnus Rabben Bautz-Holter" userId="db22932b-4f39-4bed-aec1-22a662119d71" providerId="ADAL" clId="{29BE6DC3-2335-45B1-B9A5-6879D10D3146}" dt="2025-04-22T18:44:48.596" v="6428" actId="478"/>
-          <ac:spMkLst>
-            <pc:docMk/>
-            <pc:sldMk cId="3956818408" sldId="262"/>
-            <ac:spMk id="3" creationId="{140AA4D2-8120-9483-758B-A63F71CD9C36}"/>
           </ac:spMkLst>
         </pc:spChg>
         <pc:spChg chg="add mod">
@@ -934,24 +758,8 @@
             <ac:spMk id="19" creationId="{242C5D3F-3B87-93C6-C3A6-DCCF25099513}"/>
           </ac:spMkLst>
         </pc:spChg>
-        <pc:spChg chg="add del mod">
-          <ac:chgData name="Magnus Rabben Bautz-Holter" userId="db22932b-4f39-4bed-aec1-22a662119d71" providerId="ADAL" clId="{29BE6DC3-2335-45B1-B9A5-6879D10D3146}" dt="2025-04-22T19:25:52.234" v="6890" actId="767"/>
-          <ac:spMkLst>
-            <pc:docMk/>
-            <pc:sldMk cId="3956818408" sldId="262"/>
-            <ac:spMk id="20" creationId="{6FC106E7-44AD-0F80-A203-C86341BA94BF}"/>
-          </ac:spMkLst>
-        </pc:spChg>
-        <pc:spChg chg="add del mod">
-          <ac:chgData name="Magnus Rabben Bautz-Holter" userId="db22932b-4f39-4bed-aec1-22a662119d71" providerId="ADAL" clId="{29BE6DC3-2335-45B1-B9A5-6879D10D3146}" dt="2025-04-22T19:26:56.531" v="6926" actId="478"/>
-          <ac:spMkLst>
-            <pc:docMk/>
-            <pc:sldMk cId="3956818408" sldId="262"/>
-            <ac:spMk id="21" creationId="{2FA361A2-312F-05A4-AA8C-EE712EC4A1C7}"/>
-          </ac:spMkLst>
-        </pc:spChg>
         <pc:spChg chg="add mod">
-          <ac:chgData name="Magnus Rabben Bautz-Holter" userId="db22932b-4f39-4bed-aec1-22a662119d71" providerId="ADAL" clId="{29BE6DC3-2335-45B1-B9A5-6879D10D3146}" dt="2025-04-22T19:29:32.571" v="7092" actId="20577"/>
+          <ac:chgData name="Magnus Rabben Bautz-Holter" userId="db22932b-4f39-4bed-aec1-22a662119d71" providerId="ADAL" clId="{29BE6DC3-2335-45B1-B9A5-6879D10D3146}" dt="2025-05-02T09:55:38.694" v="14375" actId="20577"/>
           <ac:spMkLst>
             <pc:docMk/>
             <pc:sldMk cId="3956818408" sldId="262"/>
@@ -982,14 +790,6 @@
             <ac:spMk id="25" creationId="{0801CFD5-6C4D-EB30-C787-2A4F7D5B6C3A}"/>
           </ac:spMkLst>
         </pc:spChg>
-        <pc:spChg chg="add del mod">
-          <ac:chgData name="Magnus Rabben Bautz-Holter" userId="db22932b-4f39-4bed-aec1-22a662119d71" providerId="ADAL" clId="{29BE6DC3-2335-45B1-B9A5-6879D10D3146}" dt="2025-04-22T23:43:19.909" v="11975" actId="478"/>
-          <ac:spMkLst>
-            <pc:docMk/>
-            <pc:sldMk cId="3956818408" sldId="262"/>
-            <ac:spMk id="26" creationId="{033042BE-C45A-07DC-A5B0-3931C07A5BAB}"/>
-          </ac:spMkLst>
-        </pc:spChg>
         <pc:graphicFrameChg chg="mod">
           <ac:chgData name="Magnus Rabben Bautz-Holter" userId="db22932b-4f39-4bed-aec1-22a662119d71" providerId="ADAL" clId="{29BE6DC3-2335-45B1-B9A5-6879D10D3146}" dt="2025-04-17T08:43:18.941" v="726"/>
           <ac:graphicFrameMkLst>
@@ -1018,30 +818,6 @@
             <pc:docMk/>
             <pc:sldMk cId="2247047604" sldId="264"/>
             <ac:spMk id="2" creationId="{009DE8FD-08A4-126E-FC62-598B094A7EAE}"/>
-          </ac:spMkLst>
-        </pc:spChg>
-        <pc:spChg chg="add del mod modVis">
-          <ac:chgData name="Magnus Rabben Bautz-Holter" userId="db22932b-4f39-4bed-aec1-22a662119d71" providerId="ADAL" clId="{29BE6DC3-2335-45B1-B9A5-6879D10D3146}" dt="2025-04-22T21:22:12.393" v="8275"/>
-          <ac:spMkLst>
-            <pc:docMk/>
-            <pc:sldMk cId="2247047604" sldId="264"/>
-            <ac:spMk id="3" creationId="{D24E8623-D925-C8E8-E18F-4200CD13F93A}"/>
-          </ac:spMkLst>
-        </pc:spChg>
-        <pc:spChg chg="add del mod modVis">
-          <ac:chgData name="Magnus Rabben Bautz-Holter" userId="db22932b-4f39-4bed-aec1-22a662119d71" providerId="ADAL" clId="{29BE6DC3-2335-45B1-B9A5-6879D10D3146}" dt="2025-04-22T21:22:14.704" v="8312"/>
-          <ac:spMkLst>
-            <pc:docMk/>
-            <pc:sldMk cId="2247047604" sldId="264"/>
-            <ac:spMk id="5" creationId="{11D443CF-A6BB-0C6F-1F80-95DD5FFB7398}"/>
-          </ac:spMkLst>
-        </pc:spChg>
-        <pc:spChg chg="add del">
-          <ac:chgData name="Magnus Rabben Bautz-Holter" userId="db22932b-4f39-4bed-aec1-22a662119d71" providerId="ADAL" clId="{29BE6DC3-2335-45B1-B9A5-6879D10D3146}" dt="2025-04-22T21:34:10.203" v="8358" actId="478"/>
-          <ac:spMkLst>
-            <pc:docMk/>
-            <pc:sldMk cId="2247047604" sldId="264"/>
-            <ac:spMk id="6" creationId="{3E153B93-615C-E57C-A040-40725D49E618}"/>
           </ac:spMkLst>
         </pc:spChg>
         <pc:spChg chg="add mod">
@@ -1076,28 +852,12 @@
             <ac:spMk id="12" creationId="{2E3CA62B-5DCB-5008-64AB-9D3B69489AFE}"/>
           </ac:spMkLst>
         </pc:spChg>
-        <pc:spChg chg="add del mod">
-          <ac:chgData name="Magnus Rabben Bautz-Holter" userId="db22932b-4f39-4bed-aec1-22a662119d71" providerId="ADAL" clId="{29BE6DC3-2335-45B1-B9A5-6879D10D3146}" dt="2025-04-22T23:43:18.046" v="11974" actId="478"/>
-          <ac:spMkLst>
-            <pc:docMk/>
-            <pc:sldMk cId="2247047604" sldId="264"/>
-            <ac:spMk id="13" creationId="{1C4E5AAF-0B4C-A043-6833-67E18FFA9993}"/>
-          </ac:spMkLst>
-        </pc:spChg>
         <pc:spChg chg="mod">
           <ac:chgData name="Magnus Rabben Bautz-Holter" userId="db22932b-4f39-4bed-aec1-22a662119d71" providerId="ADAL" clId="{29BE6DC3-2335-45B1-B9A5-6879D10D3146}" dt="2025-04-22T21:44:03.598" v="8897" actId="1036"/>
           <ac:spMkLst>
             <pc:docMk/>
             <pc:sldMk cId="2247047604" sldId="264"/>
             <ac:spMk id="20" creationId="{9F40FB26-58D8-8887-3199-6F1581E991A3}"/>
-          </ac:spMkLst>
-        </pc:spChg>
-        <pc:spChg chg="add del">
-          <ac:chgData name="Magnus Rabben Bautz-Holter" userId="db22932b-4f39-4bed-aec1-22a662119d71" providerId="ADAL" clId="{29BE6DC3-2335-45B1-B9A5-6879D10D3146}" dt="2025-04-22T21:22:50.468" v="8318" actId="478"/>
-          <ac:spMkLst>
-            <pc:docMk/>
-            <pc:sldMk cId="2247047604" sldId="264"/>
-            <ac:spMk id="25" creationId="{99D16EC3-1E9A-6521-33AA-7EB6E18AEB39}"/>
           </ac:spMkLst>
         </pc:spChg>
         <pc:spChg chg="mod">
@@ -1181,7 +941,7 @@
         </pc:graphicFrameChg>
       </pc:sldChg>
       <pc:sldChg chg="addSp delSp modSp add mod">
-        <pc:chgData name="Magnus Rabben Bautz-Holter" userId="db22932b-4f39-4bed-aec1-22a662119d71" providerId="ADAL" clId="{29BE6DC3-2335-45B1-B9A5-6879D10D3146}" dt="2025-04-23T00:16:07.033" v="13909" actId="20577"/>
+        <pc:chgData name="Magnus Rabben Bautz-Holter" userId="db22932b-4f39-4bed-aec1-22a662119d71" providerId="ADAL" clId="{29BE6DC3-2335-45B1-B9A5-6879D10D3146}" dt="2025-05-02T08:49:55.463" v="14302" actId="113"/>
         <pc:sldMkLst>
           <pc:docMk/>
           <pc:sldMk cId="2786380082" sldId="266"/>
@@ -1195,7 +955,7 @@
           </ac:spMkLst>
         </pc:spChg>
         <pc:spChg chg="add mod">
-          <ac:chgData name="Magnus Rabben Bautz-Holter" userId="db22932b-4f39-4bed-aec1-22a662119d71" providerId="ADAL" clId="{29BE6DC3-2335-45B1-B9A5-6879D10D3146}" dt="2025-04-17T10:29:29.918" v="4753" actId="113"/>
+          <ac:chgData name="Magnus Rabben Bautz-Holter" userId="db22932b-4f39-4bed-aec1-22a662119d71" providerId="ADAL" clId="{29BE6DC3-2335-45B1-B9A5-6879D10D3146}" dt="2025-05-02T08:49:52.742" v="14300" actId="113"/>
           <ac:spMkLst>
             <pc:docMk/>
             <pc:sldMk cId="2786380082" sldId="266"/>
@@ -1227,7 +987,7 @@
           </ac:spMkLst>
         </pc:spChg>
         <pc:spChg chg="add mod">
-          <ac:chgData name="Magnus Rabben Bautz-Holter" userId="db22932b-4f39-4bed-aec1-22a662119d71" providerId="ADAL" clId="{29BE6DC3-2335-45B1-B9A5-6879D10D3146}" dt="2025-04-23T00:16:07.033" v="13909" actId="20577"/>
+          <ac:chgData name="Magnus Rabben Bautz-Holter" userId="db22932b-4f39-4bed-aec1-22a662119d71" providerId="ADAL" clId="{29BE6DC3-2335-45B1-B9A5-6879D10D3146}" dt="2025-05-02T08:49:54.156" v="14301" actId="113"/>
           <ac:spMkLst>
             <pc:docMk/>
             <pc:sldMk cId="2786380082" sldId="266"/>
@@ -1235,19 +995,11 @@
           </ac:spMkLst>
         </pc:spChg>
         <pc:spChg chg="add mod">
-          <ac:chgData name="Magnus Rabben Bautz-Holter" userId="db22932b-4f39-4bed-aec1-22a662119d71" providerId="ADAL" clId="{29BE6DC3-2335-45B1-B9A5-6879D10D3146}" dt="2025-04-17T10:29:39.845" v="4755" actId="113"/>
+          <ac:chgData name="Magnus Rabben Bautz-Holter" userId="db22932b-4f39-4bed-aec1-22a662119d71" providerId="ADAL" clId="{29BE6DC3-2335-45B1-B9A5-6879D10D3146}" dt="2025-05-02T08:49:55.463" v="14302" actId="113"/>
           <ac:spMkLst>
             <pc:docMk/>
             <pc:sldMk cId="2786380082" sldId="266"/>
             <ac:spMk id="34" creationId="{53E1A3D5-461E-586C-B274-CDDA9366FAAB}"/>
-          </ac:spMkLst>
-        </pc:spChg>
-        <pc:spChg chg="add del mod">
-          <ac:chgData name="Magnus Rabben Bautz-Holter" userId="db22932b-4f39-4bed-aec1-22a662119d71" providerId="ADAL" clId="{29BE6DC3-2335-45B1-B9A5-6879D10D3146}" dt="2025-04-22T23:43:23.115" v="11977" actId="478"/>
-          <ac:spMkLst>
-            <pc:docMk/>
-            <pc:sldMk cId="2786380082" sldId="266"/>
-            <ac:spMk id="35" creationId="{4A5A998B-725E-5B55-2094-EF34F04E1BC1}"/>
           </ac:spMkLst>
         </pc:spChg>
         <pc:spChg chg="add mod">
@@ -1308,13 +1060,13 @@
         </pc:picChg>
       </pc:sldChg>
       <pc:sldChg chg="addSp delSp modSp add mod">
-        <pc:chgData name="Magnus Rabben Bautz-Holter" userId="db22932b-4f39-4bed-aec1-22a662119d71" providerId="ADAL" clId="{29BE6DC3-2335-45B1-B9A5-6879D10D3146}" dt="2025-04-22T23:43:15.902" v="11973" actId="478"/>
+        <pc:chgData name="Magnus Rabben Bautz-Holter" userId="db22932b-4f39-4bed-aec1-22a662119d71" providerId="ADAL" clId="{29BE6DC3-2335-45B1-B9A5-6879D10D3146}" dt="2025-05-02T09:19:53.664" v="14357"/>
         <pc:sldMkLst>
           <pc:docMk/>
           <pc:sldMk cId="1892836040" sldId="267"/>
         </pc:sldMkLst>
         <pc:spChg chg="mod">
-          <ac:chgData name="Magnus Rabben Bautz-Holter" userId="db22932b-4f39-4bed-aec1-22a662119d71" providerId="ADAL" clId="{29BE6DC3-2335-45B1-B9A5-6879D10D3146}" dt="2025-04-22T19:34:40.003" v="7242" actId="948"/>
+          <ac:chgData name="Magnus Rabben Bautz-Holter" userId="db22932b-4f39-4bed-aec1-22a662119d71" providerId="ADAL" clId="{29BE6DC3-2335-45B1-B9A5-6879D10D3146}" dt="2025-05-02T09:19:53.611" v="14333" actId="948"/>
           <ac:spMkLst>
             <pc:docMk/>
             <pc:sldMk cId="1892836040" sldId="267"/>
@@ -1322,19 +1074,19 @@
           </ac:spMkLst>
         </pc:spChg>
         <pc:spChg chg="add del mod modVis">
-          <ac:chgData name="Magnus Rabben Bautz-Holter" userId="db22932b-4f39-4bed-aec1-22a662119d71" providerId="ADAL" clId="{29BE6DC3-2335-45B1-B9A5-6879D10D3146}" dt="2025-04-22T19:34:40.049" v="7264"/>
+          <ac:chgData name="Magnus Rabben Bautz-Holter" userId="db22932b-4f39-4bed-aec1-22a662119d71" providerId="ADAL" clId="{29BE6DC3-2335-45B1-B9A5-6879D10D3146}" dt="2025-05-02T09:19:53.014" v="14329"/>
           <ac:spMkLst>
             <pc:docMk/>
             <pc:sldMk cId="1892836040" sldId="267"/>
-            <ac:spMk id="3" creationId="{39A1099D-5D29-1B3E-ED91-ED481C4AA188}"/>
+            <ac:spMk id="3" creationId="{101C52AB-68FA-5A38-A5C6-02AC265FB6ED}"/>
           </ac:spMkLst>
         </pc:spChg>
-        <pc:spChg chg="del mod">
-          <ac:chgData name="Magnus Rabben Bautz-Holter" userId="db22932b-4f39-4bed-aec1-22a662119d71" providerId="ADAL" clId="{29BE6DC3-2335-45B1-B9A5-6879D10D3146}" dt="2025-04-22T21:03:02.618" v="7709" actId="478"/>
+        <pc:spChg chg="add del mod modVis">
+          <ac:chgData name="Magnus Rabben Bautz-Holter" userId="db22932b-4f39-4bed-aec1-22a662119d71" providerId="ADAL" clId="{29BE6DC3-2335-45B1-B9A5-6879D10D3146}" dt="2025-05-02T09:19:53.663" v="14355"/>
           <ac:spMkLst>
             <pc:docMk/>
             <pc:sldMk cId="1892836040" sldId="267"/>
-            <ac:spMk id="5" creationId="{D12D8B5B-AB9C-1EB6-35DC-C642C5D07931}"/>
+            <ac:spMk id="5" creationId="{FC12E3A7-01F7-3C41-5C48-7AFA0DB49085}"/>
           </ac:spMkLst>
         </pc:spChg>
         <pc:spChg chg="mod">
@@ -1361,14 +1113,6 @@
             <ac:spMk id="8" creationId="{838616C2-6DA6-D277-7FD8-6E42437AB394}"/>
           </ac:spMkLst>
         </pc:spChg>
-        <pc:spChg chg="del mod">
-          <ac:chgData name="Magnus Rabben Bautz-Holter" userId="db22932b-4f39-4bed-aec1-22a662119d71" providerId="ADAL" clId="{29BE6DC3-2335-45B1-B9A5-6879D10D3146}" dt="2025-04-22T21:03:02.618" v="7709" actId="478"/>
-          <ac:spMkLst>
-            <pc:docMk/>
-            <pc:sldMk cId="1892836040" sldId="267"/>
-            <ac:spMk id="9" creationId="{C07356AB-93D6-E589-FEC7-542EE40C0DCB}"/>
-          </ac:spMkLst>
-        </pc:spChg>
         <pc:spChg chg="mod">
           <ac:chgData name="Magnus Rabben Bautz-Holter" userId="db22932b-4f39-4bed-aec1-22a662119d71" providerId="ADAL" clId="{29BE6DC3-2335-45B1-B9A5-6879D10D3146}" dt="2025-04-22T21:11:01.852" v="7975" actId="1035"/>
           <ac:spMkLst>
@@ -1391,14 +1135,6 @@
             <pc:docMk/>
             <pc:sldMk cId="1892836040" sldId="267"/>
             <ac:spMk id="12" creationId="{A6639AD9-8C26-DBEF-8650-2DD33EA921CF}"/>
-          </ac:spMkLst>
-        </pc:spChg>
-        <pc:spChg chg="del mod">
-          <ac:chgData name="Magnus Rabben Bautz-Holter" userId="db22932b-4f39-4bed-aec1-22a662119d71" providerId="ADAL" clId="{29BE6DC3-2335-45B1-B9A5-6879D10D3146}" dt="2025-04-22T21:03:02.618" v="7709" actId="478"/>
-          <ac:spMkLst>
-            <pc:docMk/>
-            <pc:sldMk cId="1892836040" sldId="267"/>
-            <ac:spMk id="13" creationId="{EED9CBA3-2D17-16E9-10DC-74F5D8165ED4}"/>
           </ac:spMkLst>
         </pc:spChg>
         <pc:spChg chg="mod">
@@ -1457,64 +1193,8 @@
             <ac:spMk id="20" creationId="{AD0DD175-9C44-BF58-AF61-44413B7AAEF6}"/>
           </ac:spMkLst>
         </pc:spChg>
-        <pc:spChg chg="add del mod">
-          <ac:chgData name="Magnus Rabben Bautz-Holter" userId="db22932b-4f39-4bed-aec1-22a662119d71" providerId="ADAL" clId="{29BE6DC3-2335-45B1-B9A5-6879D10D3146}" dt="2025-04-22T23:43:15.902" v="11973" actId="478"/>
-          <ac:spMkLst>
-            <pc:docMk/>
-            <pc:sldMk cId="1892836040" sldId="267"/>
-            <ac:spMk id="21" creationId="{A723BD8A-CD45-A7BC-24ED-302538D15FEC}"/>
-          </ac:spMkLst>
-        </pc:spChg>
-        <pc:spChg chg="del">
-          <ac:chgData name="Magnus Rabben Bautz-Holter" userId="db22932b-4f39-4bed-aec1-22a662119d71" providerId="ADAL" clId="{29BE6DC3-2335-45B1-B9A5-6879D10D3146}" dt="2025-04-22T20:50:53.899" v="7421" actId="478"/>
-          <ac:spMkLst>
-            <pc:docMk/>
-            <pc:sldMk cId="1892836040" sldId="267"/>
-            <ac:spMk id="22" creationId="{9CEAE13D-A147-8EAE-4BF3-15B232FC7E94}"/>
-          </ac:spMkLst>
-        </pc:spChg>
-        <pc:spChg chg="del mod">
-          <ac:chgData name="Magnus Rabben Bautz-Holter" userId="db22932b-4f39-4bed-aec1-22a662119d71" providerId="ADAL" clId="{29BE6DC3-2335-45B1-B9A5-6879D10D3146}" dt="2025-04-22T21:03:02.618" v="7709" actId="478"/>
-          <ac:spMkLst>
-            <pc:docMk/>
-            <pc:sldMk cId="1892836040" sldId="267"/>
-            <ac:spMk id="23" creationId="{0A5CA09E-698F-04F0-E459-09EA6ECA966B}"/>
-          </ac:spMkLst>
-        </pc:spChg>
-        <pc:spChg chg="del">
-          <ac:chgData name="Magnus Rabben Bautz-Holter" userId="db22932b-4f39-4bed-aec1-22a662119d71" providerId="ADAL" clId="{29BE6DC3-2335-45B1-B9A5-6879D10D3146}" dt="2025-04-22T21:12:48.849" v="8010" actId="478"/>
-          <ac:spMkLst>
-            <pc:docMk/>
-            <pc:sldMk cId="1892836040" sldId="267"/>
-            <ac:spMk id="24" creationId="{15541A66-721E-54DD-731D-D97506DEDA59}"/>
-          </ac:spMkLst>
-        </pc:spChg>
-        <pc:spChg chg="del">
-          <ac:chgData name="Magnus Rabben Bautz-Holter" userId="db22932b-4f39-4bed-aec1-22a662119d71" providerId="ADAL" clId="{29BE6DC3-2335-45B1-B9A5-6879D10D3146}" dt="2025-04-22T21:12:48.849" v="8010" actId="478"/>
-          <ac:spMkLst>
-            <pc:docMk/>
-            <pc:sldMk cId="1892836040" sldId="267"/>
-            <ac:spMk id="25" creationId="{A1ED8CC7-F4D0-0D92-FFD7-8F08DE157BDC}"/>
-          </ac:spMkLst>
-        </pc:spChg>
-        <pc:spChg chg="del">
-          <ac:chgData name="Magnus Rabben Bautz-Holter" userId="db22932b-4f39-4bed-aec1-22a662119d71" providerId="ADAL" clId="{29BE6DC3-2335-45B1-B9A5-6879D10D3146}" dt="2025-04-22T19:34:46.707" v="7268" actId="478"/>
-          <ac:spMkLst>
-            <pc:docMk/>
-            <pc:sldMk cId="1892836040" sldId="267"/>
-            <ac:spMk id="26" creationId="{344D06E9-F3DD-23A8-7E86-D490121F467A}"/>
-          </ac:spMkLst>
-        </pc:spChg>
-        <pc:spChg chg="add del mod">
-          <ac:chgData name="Magnus Rabben Bautz-Holter" userId="db22932b-4f39-4bed-aec1-22a662119d71" providerId="ADAL" clId="{29BE6DC3-2335-45B1-B9A5-6879D10D3146}" dt="2025-04-22T22:39:06.630" v="9279" actId="478"/>
-          <ac:spMkLst>
-            <pc:docMk/>
-            <pc:sldMk cId="1892836040" sldId="267"/>
-            <ac:spMk id="27" creationId="{C37834CA-9AAC-3039-6AA2-2EEC9ECD8982}"/>
-          </ac:spMkLst>
-        </pc:spChg>
         <pc:graphicFrameChg chg="mod">
-          <ac:chgData name="Magnus Rabben Bautz-Holter" userId="db22932b-4f39-4bed-aec1-22a662119d71" providerId="ADAL" clId="{29BE6DC3-2335-45B1-B9A5-6879D10D3146}" dt="2025-04-22T19:34:40.049" v="7266"/>
+          <ac:chgData name="Magnus Rabben Bautz-Holter" userId="db22932b-4f39-4bed-aec1-22a662119d71" providerId="ADAL" clId="{29BE6DC3-2335-45B1-B9A5-6879D10D3146}" dt="2025-05-02T09:19:53.664" v="14357"/>
           <ac:graphicFrameMkLst>
             <pc:docMk/>
             <pc:sldMk cId="1892836040" sldId="267"/>
@@ -1523,7 +1203,7 @@
         </pc:graphicFrameChg>
       </pc:sldChg>
       <pc:sldChg chg="addSp delSp modSp add mod">
-        <pc:chgData name="Magnus Rabben Bautz-Holter" userId="db22932b-4f39-4bed-aec1-22a662119d71" providerId="ADAL" clId="{29BE6DC3-2335-45B1-B9A5-6879D10D3146}" dt="2025-04-23T00:22:12.662" v="14091" actId="20577"/>
+        <pc:chgData name="Magnus Rabben Bautz-Holter" userId="db22932b-4f39-4bed-aec1-22a662119d71" providerId="ADAL" clId="{29BE6DC3-2335-45B1-B9A5-6879D10D3146}" dt="2025-05-02T09:21:59.584" v="14359" actId="14100"/>
         <pc:sldMkLst>
           <pc:docMk/>
           <pc:sldMk cId="1884896829" sldId="268"/>
@@ -1536,54 +1216,6 @@
             <ac:spMk id="2" creationId="{B2DCE3DC-C30B-3F37-8F79-E031A4E6D4B9}"/>
           </ac:spMkLst>
         </pc:spChg>
-        <pc:spChg chg="add del mod modVis">
-          <ac:chgData name="Magnus Rabben Bautz-Holter" userId="db22932b-4f39-4bed-aec1-22a662119d71" providerId="ADAL" clId="{29BE6DC3-2335-45B1-B9A5-6879D10D3146}" dt="2025-04-22T22:39:18.369" v="9309"/>
-          <ac:spMkLst>
-            <pc:docMk/>
-            <pc:sldMk cId="1884896829" sldId="268"/>
-            <ac:spMk id="3" creationId="{6FE98891-A43F-9053-1672-96AB56539C4B}"/>
-          </ac:spMkLst>
-        </pc:spChg>
-        <pc:spChg chg="add del mod modVis">
-          <ac:chgData name="Magnus Rabben Bautz-Holter" userId="db22932b-4f39-4bed-aec1-22a662119d71" providerId="ADAL" clId="{29BE6DC3-2335-45B1-B9A5-6879D10D3146}" dt="2025-04-22T22:39:21.436" v="9335"/>
-          <ac:spMkLst>
-            <pc:docMk/>
-            <pc:sldMk cId="1884896829" sldId="268"/>
-            <ac:spMk id="5" creationId="{9DC93FC6-F755-400B-9E71-861B3B237CE4}"/>
-          </ac:spMkLst>
-        </pc:spChg>
-        <pc:spChg chg="add del mod modVis">
-          <ac:chgData name="Magnus Rabben Bautz-Holter" userId="db22932b-4f39-4bed-aec1-22a662119d71" providerId="ADAL" clId="{29BE6DC3-2335-45B1-B9A5-6879D10D3146}" dt="2025-04-22T22:39:22.994" v="9361"/>
-          <ac:spMkLst>
-            <pc:docMk/>
-            <pc:sldMk cId="1884896829" sldId="268"/>
-            <ac:spMk id="6" creationId="{870AEDD6-8A35-C348-96A8-F90DD0FC9121}"/>
-          </ac:spMkLst>
-        </pc:spChg>
-        <pc:spChg chg="del">
-          <ac:chgData name="Magnus Rabben Bautz-Holter" userId="db22932b-4f39-4bed-aec1-22a662119d71" providerId="ADAL" clId="{29BE6DC3-2335-45B1-B9A5-6879D10D3146}" dt="2025-04-22T22:39:51.687" v="9386" actId="478"/>
-          <ac:spMkLst>
-            <pc:docMk/>
-            <pc:sldMk cId="1884896829" sldId="268"/>
-            <ac:spMk id="7" creationId="{A864F26D-1D59-DB66-030E-BE0194072507}"/>
-          </ac:spMkLst>
-        </pc:spChg>
-        <pc:spChg chg="del">
-          <ac:chgData name="Magnus Rabben Bautz-Holter" userId="db22932b-4f39-4bed-aec1-22a662119d71" providerId="ADAL" clId="{29BE6DC3-2335-45B1-B9A5-6879D10D3146}" dt="2025-04-22T22:39:51.687" v="9386" actId="478"/>
-          <ac:spMkLst>
-            <pc:docMk/>
-            <pc:sldMk cId="1884896829" sldId="268"/>
-            <ac:spMk id="8" creationId="{36C74FB4-C3F0-E925-724D-BA5DC7289E9A}"/>
-          </ac:spMkLst>
-        </pc:spChg>
-        <pc:spChg chg="del">
-          <ac:chgData name="Magnus Rabben Bautz-Holter" userId="db22932b-4f39-4bed-aec1-22a662119d71" providerId="ADAL" clId="{29BE6DC3-2335-45B1-B9A5-6879D10D3146}" dt="2025-04-22T22:40:45.721" v="9418" actId="478"/>
-          <ac:spMkLst>
-            <pc:docMk/>
-            <pc:sldMk cId="1884896829" sldId="268"/>
-            <ac:spMk id="9" creationId="{8F1E281F-8DC5-5C8C-69D3-AE3B9431C81B}"/>
-          </ac:spMkLst>
-        </pc:spChg>
         <pc:spChg chg="mod">
           <ac:chgData name="Magnus Rabben Bautz-Holter" userId="db22932b-4f39-4bed-aec1-22a662119d71" providerId="ADAL" clId="{29BE6DC3-2335-45B1-B9A5-6879D10D3146}" dt="2025-04-23T00:22:12.662" v="14091" actId="20577"/>
           <ac:spMkLst>
@@ -1592,28 +1224,12 @@
             <ac:spMk id="12" creationId="{ACE6F539-43B6-17E6-4671-4FFB23EE392C}"/>
           </ac:spMkLst>
         </pc:spChg>
-        <pc:spChg chg="del">
-          <ac:chgData name="Magnus Rabben Bautz-Holter" userId="db22932b-4f39-4bed-aec1-22a662119d71" providerId="ADAL" clId="{29BE6DC3-2335-45B1-B9A5-6879D10D3146}" dt="2025-04-22T22:39:11.318" v="9281" actId="478"/>
-          <ac:spMkLst>
-            <pc:docMk/>
-            <pc:sldMk cId="1884896829" sldId="268"/>
-            <ac:spMk id="13" creationId="{97781A15-E967-BE6A-F647-ED704CF0AA46}"/>
-          </ac:spMkLst>
-        </pc:spChg>
         <pc:spChg chg="add mod">
           <ac:chgData name="Magnus Rabben Bautz-Holter" userId="db22932b-4f39-4bed-aec1-22a662119d71" providerId="ADAL" clId="{29BE6DC3-2335-45B1-B9A5-6879D10D3146}" dt="2025-04-22T22:50:17.085" v="9700" actId="5793"/>
           <ac:spMkLst>
             <pc:docMk/>
             <pc:sldMk cId="1884896829" sldId="268"/>
             <ac:spMk id="15" creationId="{A7C159C0-867F-56D8-CFD9-14FAC8AA8C6F}"/>
-          </ac:spMkLst>
-        </pc:spChg>
-        <pc:spChg chg="add del mod">
-          <ac:chgData name="Magnus Rabben Bautz-Holter" userId="db22932b-4f39-4bed-aec1-22a662119d71" providerId="ADAL" clId="{29BE6DC3-2335-45B1-B9A5-6879D10D3146}" dt="2025-04-22T23:43:13.687" v="11972" actId="478"/>
-          <ac:spMkLst>
-            <pc:docMk/>
-            <pc:sldMk cId="1884896829" sldId="268"/>
-            <ac:spMk id="17" creationId="{72A885C6-DA50-C33A-4EA8-386F564F14B2}"/>
           </ac:spMkLst>
         </pc:spChg>
         <pc:spChg chg="mod">
@@ -1657,7 +1273,7 @@
           </ac:picMkLst>
         </pc:picChg>
         <pc:picChg chg="add mod">
-          <ac:chgData name="Magnus Rabben Bautz-Holter" userId="db22932b-4f39-4bed-aec1-22a662119d71" providerId="ADAL" clId="{29BE6DC3-2335-45B1-B9A5-6879D10D3146}" dt="2025-04-22T23:02:59.457" v="9831" actId="14100"/>
+          <ac:chgData name="Magnus Rabben Bautz-Holter" userId="db22932b-4f39-4bed-aec1-22a662119d71" providerId="ADAL" clId="{29BE6DC3-2335-45B1-B9A5-6879D10D3146}" dt="2025-05-02T09:21:59.584" v="14359" actId="14100"/>
           <ac:picMkLst>
             <pc:docMk/>
             <pc:sldMk cId="1884896829" sldId="268"/>
@@ -1859,7 +1475,7 @@
           <a:p>
             <a:fld id="{8F4E783D-C4F5-4102-8F73-F0011D1C5723}" type="datetimeFigureOut">
               <a:rPr lang="en-US" smtClean="0"/>
-              <a:t>4/22/2025</a:t>
+              <a:t>5/2/2025</a:t>
             </a:fld>
             <a:endParaRPr lang="en-US"/>
           </a:p>
@@ -2073,7 +1689,7 @@
           <a:p>
             <a:fld id="{8F4E783D-C4F5-4102-8F73-F0011D1C5723}" type="datetimeFigureOut">
               <a:rPr lang="en-US" smtClean="0"/>
-              <a:t>4/22/2025</a:t>
+              <a:t>5/2/2025</a:t>
             </a:fld>
             <a:endParaRPr lang="en-US"/>
           </a:p>
@@ -2281,7 +1897,7 @@
           <a:p>
             <a:fld id="{8F4E783D-C4F5-4102-8F73-F0011D1C5723}" type="datetimeFigureOut">
               <a:rPr lang="en-US" smtClean="0"/>
-              <a:t>4/22/2025</a:t>
+              <a:t>5/2/2025</a:t>
             </a:fld>
             <a:endParaRPr lang="en-US"/>
           </a:p>
@@ -2566,7 +2182,7 @@
           <a:p>
             <a:fld id="{8F4E783D-C4F5-4102-8F73-F0011D1C5723}" type="datetimeFigureOut">
               <a:rPr lang="en-US" smtClean="0"/>
-              <a:t>4/22/2025</a:t>
+              <a:t>5/2/2025</a:t>
             </a:fld>
             <a:endParaRPr lang="en-US"/>
           </a:p>
@@ -2897,7 +2513,7 @@
           <a:p>
             <a:fld id="{8F4E783D-C4F5-4102-8F73-F0011D1C5723}" type="datetimeFigureOut">
               <a:rPr lang="en-US" smtClean="0"/>
-              <a:t>4/22/2025</a:t>
+              <a:t>5/2/2025</a:t>
             </a:fld>
             <a:endParaRPr lang="en-US"/>
           </a:p>
@@ -3162,7 +2778,7 @@
           <a:p>
             <a:fld id="{8F4E783D-C4F5-4102-8F73-F0011D1C5723}" type="datetimeFigureOut">
               <a:rPr lang="en-US" smtClean="0"/>
-              <a:t>4/22/2025</a:t>
+              <a:t>5/2/2025</a:t>
             </a:fld>
             <a:endParaRPr lang="en-US"/>
           </a:p>
@@ -3574,7 +3190,7 @@
           <a:p>
             <a:fld id="{8F4E783D-C4F5-4102-8F73-F0011D1C5723}" type="datetimeFigureOut">
               <a:rPr lang="en-US" smtClean="0"/>
-              <a:t>4/22/2025</a:t>
+              <a:t>5/2/2025</a:t>
             </a:fld>
             <a:endParaRPr lang="en-US"/>
           </a:p>
@@ -3715,7 +3331,7 @@
           <a:p>
             <a:fld id="{8F4E783D-C4F5-4102-8F73-F0011D1C5723}" type="datetimeFigureOut">
               <a:rPr lang="en-US" smtClean="0"/>
-              <a:t>4/22/2025</a:t>
+              <a:t>5/2/2025</a:t>
             </a:fld>
             <a:endParaRPr lang="en-US"/>
           </a:p>
@@ -3828,7 +3444,7 @@
           <a:p>
             <a:fld id="{8F4E783D-C4F5-4102-8F73-F0011D1C5723}" type="datetimeFigureOut">
               <a:rPr lang="en-US" smtClean="0"/>
-              <a:t>4/22/2025</a:t>
+              <a:t>5/2/2025</a:t>
             </a:fld>
             <a:endParaRPr lang="en-US"/>
           </a:p>
@@ -4139,7 +3755,7 @@
           <a:p>
             <a:fld id="{8F4E783D-C4F5-4102-8F73-F0011D1C5723}" type="datetimeFigureOut">
               <a:rPr lang="en-US" smtClean="0"/>
-              <a:t>4/22/2025</a:t>
+              <a:t>5/2/2025</a:t>
             </a:fld>
             <a:endParaRPr lang="en-US"/>
           </a:p>
@@ -4427,7 +4043,7 @@
           <a:p>
             <a:fld id="{8F4E783D-C4F5-4102-8F73-F0011D1C5723}" type="datetimeFigureOut">
               <a:rPr lang="en-US" smtClean="0"/>
-              <a:t>4/22/2025</a:t>
+              <a:t>5/2/2025</a:t>
             </a:fld>
             <a:endParaRPr lang="en-US"/>
           </a:p>
@@ -4740,7 +4356,7 @@
           <a:p>
             <a:fld id="{8F4E783D-C4F5-4102-8F73-F0011D1C5723}" type="datetimeFigureOut">
               <a:rPr lang="en-US" smtClean="0"/>
-              <a:t>4/22/2025</a:t>
+              <a:t>5/2/2025</a:t>
             </a:fld>
             <a:endParaRPr lang="en-US"/>
           </a:p>
@@ -5413,7 +5029,7 @@
         </p:nvSpPr>
         <p:spPr>
           <a:xfrm>
-            <a:off x="397266" y="1100201"/>
+            <a:off x="492516" y="1100201"/>
             <a:ext cx="1960098" cy="291356"/>
           </a:xfrm>
           <a:prstGeom prst="roundRect">
@@ -6134,7 +5750,7 @@
             </a:pPr>
             <a:r>
               <a:rPr lang="en-US" dirty="0"/>
-              <a:t>A 1% change in payroll employment gives 1.5-2% increase in MoM S&amp;P 500 returns</a:t>
+              <a:t>A 1% increase in payroll numbers gives 1.5-2% increase in MoM S&amp;P 500 returns</a:t>
             </a:r>
           </a:p>
           <a:p>
@@ -7290,7 +6906,7 @@
             </p:custDataLst>
             <p:extLst>
               <p:ext uri="{D42A27DB-BD31-4B8C-83A1-F6EECF244321}">
-                <p14:modId xmlns:p14="http://schemas.microsoft.com/office/powerpoint/2010/main" val="3691676149"/>
+                <p14:modId xmlns:p14="http://schemas.microsoft.com/office/powerpoint/2010/main" val="505691562"/>
               </p:ext>
             </p:extLst>
           </p:nvPr>
@@ -7377,7 +6993,7 @@
                 <a:latin typeface="Arial" panose="020B0604020202020204" pitchFamily="34" charset="0"/>
                 <a:cs typeface="Arial" panose="020B0604020202020204" pitchFamily="34" charset="0"/>
               </a:rPr>
-              <a:t>Problem statement – what do I want to research?</a:t>
+              <a:t>Problem statement | What do I want to research?</a:t>
             </a:r>
             <a:endParaRPr lang="en-US" sz="2400" dirty="0">
               <a:latin typeface="Arial" panose="020B0604020202020204" pitchFamily="34" charset="0"/>
@@ -8552,7 +8168,7 @@
           <a:lstStyle/>
           <a:p>
             <a:r>
-              <a:rPr lang="en-US" i="1" dirty="0"/>
+              <a:rPr lang="en-US" b="1" i="1" dirty="0"/>
               <a:t>Transformation steps:</a:t>
             </a:r>
           </a:p>
@@ -8910,10 +8526,10 @@
           <a:lstStyle/>
           <a:p>
             <a:r>
-              <a:rPr lang="en-US" i="1" dirty="0"/>
+              <a:rPr lang="en-US" b="1" i="1" dirty="0"/>
               <a:t>Transformation steps:</a:t>
             </a:r>
-            <a:endParaRPr lang="en-US" dirty="0"/>
+            <a:endParaRPr lang="en-US" b="1" dirty="0"/>
           </a:p>
           <a:p>
             <a:pPr marL="285750" indent="-285750">
@@ -8977,7 +8593,7 @@
           <a:lstStyle/>
           <a:p>
             <a:r>
-              <a:rPr lang="en-US" i="1" dirty="0"/>
+              <a:rPr lang="en-US" b="1" i="1" dirty="0"/>
               <a:t>Transformation steps:</a:t>
             </a:r>
           </a:p>
@@ -10128,8 +9744,8 @@
           </a:p>
         </p:txBody>
       </p:sp>
-      <mc:AlternateContent xmlns:mc="http://schemas.openxmlformats.org/markup-compatibility/2006">
-        <mc:Choice xmlns:a14="http://schemas.microsoft.com/office/drawing/2010/main" Requires="a14">
+      <mc:AlternateContent xmlns:mc="http://schemas.openxmlformats.org/markup-compatibility/2006" xmlns:a14="http://schemas.microsoft.com/office/drawing/2010/main">
+        <mc:Choice Requires="a14">
           <p:sp>
             <p:nvSpPr>
               <p:cNvPr id="9" name="Rectangle: Rounded Corners 8">
@@ -10280,7 +9896,7 @@
             </p:txBody>
           </p:sp>
         </mc:Choice>
-        <mc:Fallback>
+        <mc:Fallback xmlns="">
           <p:sp>
             <p:nvSpPr>
               <p:cNvPr id="9" name="Rectangle: Rounded Corners 8">
@@ -10330,8 +9946,8 @@
           </p:sp>
         </mc:Fallback>
       </mc:AlternateContent>
-      <mc:AlternateContent xmlns:mc="http://schemas.openxmlformats.org/markup-compatibility/2006">
-        <mc:Choice xmlns:a14="http://schemas.microsoft.com/office/drawing/2010/main" Requires="a14">
+      <mc:AlternateContent xmlns:mc="http://schemas.openxmlformats.org/markup-compatibility/2006" xmlns:a14="http://schemas.microsoft.com/office/drawing/2010/main">
+        <mc:Choice Requires="a14">
           <p:sp>
             <p:nvSpPr>
               <p:cNvPr id="10" name="Rectangle: Rounded Corners 9">
@@ -10480,7 +10096,7 @@
             </p:txBody>
           </p:sp>
         </mc:Choice>
-        <mc:Fallback>
+        <mc:Fallback xmlns="">
           <p:sp>
             <p:nvSpPr>
               <p:cNvPr id="10" name="Rectangle: Rounded Corners 9">
@@ -10530,8 +10146,8 @@
           </p:sp>
         </mc:Fallback>
       </mc:AlternateContent>
-      <mc:AlternateContent xmlns:mc="http://schemas.openxmlformats.org/markup-compatibility/2006">
-        <mc:Choice xmlns:a14="http://schemas.microsoft.com/office/drawing/2010/main" Requires="a14">
+      <mc:AlternateContent xmlns:mc="http://schemas.openxmlformats.org/markup-compatibility/2006" xmlns:a14="http://schemas.microsoft.com/office/drawing/2010/main">
+        <mc:Choice Requires="a14">
           <p:sp>
             <p:nvSpPr>
               <p:cNvPr id="11" name="Rectangle: Rounded Corners 10">
@@ -10682,7 +10298,7 @@
             </p:txBody>
           </p:sp>
         </mc:Choice>
-        <mc:Fallback>
+        <mc:Fallback xmlns="">
           <p:sp>
             <p:nvSpPr>
               <p:cNvPr id="11" name="Rectangle: Rounded Corners 10">
@@ -10732,8 +10348,8 @@
           </p:sp>
         </mc:Fallback>
       </mc:AlternateContent>
-      <mc:AlternateContent xmlns:mc="http://schemas.openxmlformats.org/markup-compatibility/2006">
-        <mc:Choice xmlns:a14="http://schemas.microsoft.com/office/drawing/2010/main" Requires="a14">
+      <mc:AlternateContent xmlns:mc="http://schemas.openxmlformats.org/markup-compatibility/2006" xmlns:a14="http://schemas.microsoft.com/office/drawing/2010/main">
+        <mc:Choice Requires="a14">
           <p:sp>
             <p:nvSpPr>
               <p:cNvPr id="12" name="Rectangle: Rounded Corners 11">
@@ -10870,7 +10486,7 @@
             </p:txBody>
           </p:sp>
         </mc:Choice>
-        <mc:Fallback>
+        <mc:Fallback xmlns="">
           <p:sp>
             <p:nvSpPr>
               <p:cNvPr id="12" name="Rectangle: Rounded Corners 11">
@@ -11618,6 +11234,45 @@
                     </m:sSub>
                   </m:oMath>
                 </a14:m>
+                <a:r>
+                  <a:rPr lang="en-US" sz="1400" dirty="0"/>
+                  <a:t> or </a:t>
+                </a:r>
+                <a14:m>
+                  <m:oMath xmlns:m="http://schemas.openxmlformats.org/officeDocument/2006/math">
+                    <m:sSub>
+                      <m:sSubPr>
+                        <m:ctrlPr>
+                          <a:rPr lang="en-US" sz="1400" b="0" i="1" smtClean="0">
+                            <a:latin typeface="Cambria Math" panose="02040503050406030204" pitchFamily="18" charset="0"/>
+                          </a:rPr>
+                        </m:ctrlPr>
+                      </m:sSubPr>
+                      <m:e>
+                        <m:r>
+                          <a:rPr lang="en-US" sz="1400" b="0" i="1" smtClean="0">
+                            <a:latin typeface="Cambria Math" panose="02040503050406030204" pitchFamily="18" charset="0"/>
+                          </a:rPr>
+                          <m:t>𝑢</m:t>
+                        </m:r>
+                      </m:e>
+                      <m:sub>
+                        <m:r>
+                          <a:rPr lang="en-US" sz="1400" b="0" i="1" smtClean="0">
+                            <a:latin typeface="Cambria Math" panose="02040503050406030204" pitchFamily="18" charset="0"/>
+                          </a:rPr>
+                          <m:t>𝑡</m:t>
+                        </m:r>
+                        <m:r>
+                          <a:rPr lang="en-US" sz="1400" b="0" i="1" smtClean="0">
+                            <a:latin typeface="Cambria Math" panose="02040503050406030204" pitchFamily="18" charset="0"/>
+                          </a:rPr>
+                          <m:t>−1</m:t>
+                        </m:r>
+                      </m:sub>
+                    </m:sSub>
+                  </m:oMath>
+                </a14:m>
                 <a:endParaRPr lang="en-US" sz="1400" dirty="0"/>
               </a:p>
             </p:txBody>
@@ -11668,8 +11323,8 @@
           </p:sp>
         </mc:Fallback>
       </mc:AlternateContent>
-      <mc:AlternateContent xmlns:mc="http://schemas.openxmlformats.org/markup-compatibility/2006">
-        <mc:Choice xmlns:a14="http://schemas.microsoft.com/office/drawing/2010/main" Requires="a14">
+      <mc:AlternateContent xmlns:mc="http://schemas.openxmlformats.org/markup-compatibility/2006" xmlns:a14="http://schemas.microsoft.com/office/drawing/2010/main">
+        <mc:Choice Requires="a14">
           <p:sp>
             <p:nvSpPr>
               <p:cNvPr id="23" name="TextBox 22">
@@ -11735,7 +11390,7 @@
             </p:txBody>
           </p:sp>
         </mc:Choice>
-        <mc:Fallback>
+        <mc:Fallback xmlns="">
           <p:sp>
             <p:nvSpPr>
               <p:cNvPr id="23" name="TextBox 22">
@@ -11780,8 +11435,8 @@
           </p:sp>
         </mc:Fallback>
       </mc:AlternateContent>
-      <mc:AlternateContent xmlns:mc="http://schemas.openxmlformats.org/markup-compatibility/2006">
-        <mc:Choice xmlns:a14="http://schemas.microsoft.com/office/drawing/2010/main" Requires="a14">
+      <mc:AlternateContent xmlns:mc="http://schemas.openxmlformats.org/markup-compatibility/2006" xmlns:a14="http://schemas.microsoft.com/office/drawing/2010/main">
+        <mc:Choice Requires="a14">
           <p:sp>
             <p:nvSpPr>
               <p:cNvPr id="24" name="TextBox 23">
@@ -11896,7 +11551,7 @@
             </p:txBody>
           </p:sp>
         </mc:Choice>
-        <mc:Fallback>
+        <mc:Fallback xmlns="">
           <p:sp>
             <p:nvSpPr>
               <p:cNvPr id="24" name="TextBox 23">
@@ -11941,8 +11596,8 @@
           </p:sp>
         </mc:Fallback>
       </mc:AlternateContent>
-      <mc:AlternateContent xmlns:mc="http://schemas.openxmlformats.org/markup-compatibility/2006">
-        <mc:Choice xmlns:a14="http://schemas.microsoft.com/office/drawing/2010/main" Requires="a14">
+      <mc:AlternateContent xmlns:mc="http://schemas.openxmlformats.org/markup-compatibility/2006" xmlns:a14="http://schemas.microsoft.com/office/drawing/2010/main">
+        <mc:Choice Requires="a14">
           <p:sp>
             <p:nvSpPr>
               <p:cNvPr id="25" name="TextBox 24">
@@ -12025,7 +11680,7 @@
             </p:txBody>
           </p:sp>
         </mc:Choice>
-        <mc:Fallback>
+        <mc:Fallback xmlns="">
           <p:sp>
             <p:nvSpPr>
               <p:cNvPr id="25" name="TextBox 24">
@@ -12318,8 +11973,8 @@
           </a:p>
         </p:txBody>
       </p:sp>
-      <mc:AlternateContent xmlns:mc="http://schemas.openxmlformats.org/markup-compatibility/2006">
-        <mc:Choice xmlns:a14="http://schemas.microsoft.com/office/drawing/2010/main" Requires="a14">
+      <mc:AlternateContent xmlns:mc="http://schemas.openxmlformats.org/markup-compatibility/2006" xmlns:a14="http://schemas.microsoft.com/office/drawing/2010/main">
+        <mc:Choice Requires="a14">
           <p:sp>
             <p:nvSpPr>
               <p:cNvPr id="7" name="Rectangle: Rounded Corners 6">
@@ -12578,7 +12233,7 @@
             </p:txBody>
           </p:sp>
         </mc:Choice>
-        <mc:Fallback>
+        <mc:Fallback xmlns="">
           <p:sp>
             <p:nvSpPr>
               <p:cNvPr id="7" name="Rectangle: Rounded Corners 6">
@@ -12628,8 +12283,8 @@
           </p:sp>
         </mc:Fallback>
       </mc:AlternateContent>
-      <mc:AlternateContent xmlns:mc="http://schemas.openxmlformats.org/markup-compatibility/2006">
-        <mc:Choice xmlns:a14="http://schemas.microsoft.com/office/drawing/2010/main" Requires="a14">
+      <mc:AlternateContent xmlns:mc="http://schemas.openxmlformats.org/markup-compatibility/2006" xmlns:a14="http://schemas.microsoft.com/office/drawing/2010/main">
+        <mc:Choice Requires="a14">
           <p:sp>
             <p:nvSpPr>
               <p:cNvPr id="8" name="Rectangle: Rounded Corners 7">
@@ -12947,7 +12602,7 @@
             </p:txBody>
           </p:sp>
         </mc:Choice>
-        <mc:Fallback>
+        <mc:Fallback xmlns="">
           <p:sp>
             <p:nvSpPr>
               <p:cNvPr id="8" name="Rectangle: Rounded Corners 7">
@@ -13221,7 +12876,7 @@
             </p:custDataLst>
             <p:extLst>
               <p:ext uri="{D42A27DB-BD31-4B8C-83A1-F6EECF244321}">
-                <p14:modId xmlns:p14="http://schemas.microsoft.com/office/powerpoint/2010/main" val="588541303"/>
+                <p14:modId xmlns:p14="http://schemas.microsoft.com/office/powerpoint/2010/main" val="2879521309"/>
               </p:ext>
             </p:extLst>
           </p:nvPr>
@@ -13308,7 +12963,7 @@
                 <a:latin typeface="Arial" panose="020B0604020202020204" pitchFamily="34" charset="0"/>
                 <a:cs typeface="Arial" panose="020B0604020202020204" pitchFamily="34" charset="0"/>
               </a:rPr>
-              <a:t>Empirical analysis | The GARCH model</a:t>
+              <a:t>Empirical analysis | The GARCH(1,1) model</a:t>
             </a:r>
             <a:endParaRPr lang="en-US" sz="2400" dirty="0">
               <a:latin typeface="Arial" panose="020B0604020202020204" pitchFamily="34" charset="0"/>
@@ -13317,8 +12972,8 @@
           </a:p>
         </p:txBody>
       </p:sp>
-      <mc:AlternateContent xmlns:mc="http://schemas.openxmlformats.org/markup-compatibility/2006">
-        <mc:Choice xmlns:a14="http://schemas.microsoft.com/office/drawing/2010/main" Requires="a14">
+      <mc:AlternateContent xmlns:mc="http://schemas.openxmlformats.org/markup-compatibility/2006" xmlns:a14="http://schemas.microsoft.com/office/drawing/2010/main">
+        <mc:Choice Requires="a14">
           <p:sp>
             <p:nvSpPr>
               <p:cNvPr id="7" name="Rectangle 6">
@@ -13752,7 +13407,7 @@
             </p:txBody>
           </p:sp>
         </mc:Choice>
-        <mc:Fallback>
+        <mc:Fallback xmlns="">
           <p:sp>
             <p:nvSpPr>
               <p:cNvPr id="7" name="Rectangle 6">
@@ -14051,8 +13706,8 @@
           </a:p>
         </p:txBody>
       </p:sp>
-      <mc:AlternateContent xmlns:mc="http://schemas.openxmlformats.org/markup-compatibility/2006">
-        <mc:Choice xmlns:a14="http://schemas.microsoft.com/office/drawing/2010/main" Requires="a14">
+      <mc:AlternateContent xmlns:mc="http://schemas.openxmlformats.org/markup-compatibility/2006" xmlns:a14="http://schemas.microsoft.com/office/drawing/2010/main">
+        <mc:Choice Requires="a14">
           <p:sp>
             <p:nvSpPr>
               <p:cNvPr id="14" name="Oval 13">
@@ -14125,7 +13780,7 @@
             </p:txBody>
           </p:sp>
         </mc:Choice>
-        <mc:Fallback>
+        <mc:Fallback xmlns="">
           <p:sp>
             <p:nvSpPr>
               <p:cNvPr id="14" name="Oval 13">
@@ -14170,8 +13825,8 @@
           </p:sp>
         </mc:Fallback>
       </mc:AlternateContent>
-      <mc:AlternateContent xmlns:mc="http://schemas.openxmlformats.org/markup-compatibility/2006">
-        <mc:Choice xmlns:a14="http://schemas.microsoft.com/office/drawing/2010/main" Requires="a14">
+      <mc:AlternateContent xmlns:mc="http://schemas.openxmlformats.org/markup-compatibility/2006" xmlns:a14="http://schemas.microsoft.com/office/drawing/2010/main">
+        <mc:Choice Requires="a14">
           <p:sp>
             <p:nvSpPr>
               <p:cNvPr id="15" name="Oval 14">
@@ -14245,7 +13900,7 @@
             </p:txBody>
           </p:sp>
         </mc:Choice>
-        <mc:Fallback>
+        <mc:Fallback xmlns="">
           <p:sp>
             <p:nvSpPr>
               <p:cNvPr id="15" name="Oval 14">
@@ -14290,8 +13945,8 @@
           </p:sp>
         </mc:Fallback>
       </mc:AlternateContent>
-      <mc:AlternateContent xmlns:mc="http://schemas.openxmlformats.org/markup-compatibility/2006">
-        <mc:Choice xmlns:a14="http://schemas.microsoft.com/office/drawing/2010/main" Requires="a14">
+      <mc:AlternateContent xmlns:mc="http://schemas.openxmlformats.org/markup-compatibility/2006" xmlns:a14="http://schemas.microsoft.com/office/drawing/2010/main">
+        <mc:Choice Requires="a14">
           <p:sp>
             <p:nvSpPr>
               <p:cNvPr id="16" name="Oval 15">
@@ -14364,7 +14019,7 @@
             </p:txBody>
           </p:sp>
         </mc:Choice>
-        <mc:Fallback>
+        <mc:Fallback xmlns="">
           <p:sp>
             <p:nvSpPr>
               <p:cNvPr id="16" name="Oval 15">
@@ -14671,8 +14326,8 @@
           </a:p>
         </p:txBody>
       </p:sp>
-      <mc:AlternateContent xmlns:mc="http://schemas.openxmlformats.org/markup-compatibility/2006">
-        <mc:Choice xmlns:a14="http://schemas.microsoft.com/office/drawing/2010/main" Requires="a14">
+      <mc:AlternateContent xmlns:mc="http://schemas.openxmlformats.org/markup-compatibility/2006" xmlns:a14="http://schemas.microsoft.com/office/drawing/2010/main">
+        <mc:Choice Requires="a14">
           <p:sp>
             <p:nvSpPr>
               <p:cNvPr id="20" name="TextBox 19">
@@ -14861,7 +14516,7 @@
             </p:txBody>
           </p:sp>
         </mc:Choice>
-        <mc:Fallback>
+        <mc:Fallback xmlns="">
           <p:sp>
             <p:nvSpPr>
               <p:cNvPr id="20" name="TextBox 19">
@@ -15340,8 +14995,8 @@
         </p:blipFill>
         <p:spPr>
           <a:xfrm>
-            <a:off x="4755418" y="3396032"/>
-            <a:ext cx="6257690" cy="1571284"/>
+            <a:off x="4686264" y="3396031"/>
+            <a:ext cx="6395998" cy="1606013"/>
           </a:xfrm>
           <a:prstGeom prst="rect">
             <a:avLst/>

</xml_diff>